<commit_message>
Updated presentation (new modules and screenshots)
git-svn-id: https://subversion.assembla.com/svn/slicerrt/trunk/SlicerRt/doc@262 25a7314f-c4c8-4314-9936-a25f8480a772
</commit_message>
<xml_diff>
--- a/overview/SlicerRtOverview.pptx
+++ b/overview/SlicerRtOverview.pptx
@@ -5,7 +5,7 @@
     <p:sldMasterId id="2147483648" r:id="rId1"/>
   </p:sldMasterIdLst>
   <p:notesMasterIdLst>
-    <p:notesMasterId r:id="rId18"/>
+    <p:notesMasterId r:id="rId20"/>
   </p:notesMasterIdLst>
   <p:sldIdLst>
     <p:sldId id="256" r:id="rId2"/>
@@ -19,11 +19,13 @@
     <p:sldId id="397" r:id="rId10"/>
     <p:sldId id="398" r:id="rId11"/>
     <p:sldId id="392" r:id="rId12"/>
-    <p:sldId id="401" r:id="rId13"/>
-    <p:sldId id="390" r:id="rId14"/>
-    <p:sldId id="399" r:id="rId15"/>
-    <p:sldId id="379" r:id="rId16"/>
-    <p:sldId id="381" r:id="rId17"/>
+    <p:sldId id="402" r:id="rId13"/>
+    <p:sldId id="403" r:id="rId14"/>
+    <p:sldId id="401" r:id="rId15"/>
+    <p:sldId id="390" r:id="rId16"/>
+    <p:sldId id="399" r:id="rId17"/>
+    <p:sldId id="379" r:id="rId18"/>
+    <p:sldId id="381" r:id="rId19"/>
   </p:sldIdLst>
   <p:sldSz cx="9144000" cy="6858000" type="screen4x3"/>
   <p:notesSz cx="6858000" cy="9144000"/>
@@ -262,7 +264,7 @@
               <a:pPr>
                 <a:defRPr/>
               </a:pPr>
-              <a:t>7/24/2012</a:t>
+              <a:t>8/20/2012</a:t>
             </a:fld>
             <a:endParaRPr lang="en-US"/>
           </a:p>
@@ -901,7 +903,7 @@
             <a:fld id="{1F1EA7EA-3873-4A18-AC34-55CD348F4F74}" type="slidenum">
               <a:rPr lang="en-US" smtClean="0"/>
               <a:pPr/>
-              <a:t>14</a:t>
+              <a:t>13</a:t>
             </a:fld>
             <a:endParaRPr lang="en-US"/>
           </a:p>
@@ -961,7 +963,7 @@
           </a:bodyPr>
           <a:lstStyle/>
           <a:p>
-            <a:endParaRPr lang="en-US" dirty="0" smtClean="0"/>
+            <a:endParaRPr lang="en-CA" dirty="0"/>
           </a:p>
         </p:txBody>
       </p:sp>
@@ -983,7 +985,7 @@
             <a:fld id="{1F1EA7EA-3873-4A18-AC34-55CD348F4F74}" type="slidenum">
               <a:rPr lang="en-US" smtClean="0"/>
               <a:pPr/>
-              <a:t>15</a:t>
+              <a:t>14</a:t>
             </a:fld>
             <a:endParaRPr lang="en-US"/>
           </a:p>
@@ -1066,6 +1068,170 @@
               <a:rPr lang="en-US" smtClean="0"/>
               <a:pPr/>
               <a:t>16</a:t>
+            </a:fld>
+            <a:endParaRPr lang="en-US"/>
+          </a:p>
+        </p:txBody>
+      </p:sp>
+    </p:spTree>
+  </p:cSld>
+  <p:clrMapOvr>
+    <a:masterClrMapping/>
+  </p:clrMapOvr>
+</p:notes>
+</file>
+
+<file path=ppt/notesSlides/notesSlide15.xml><?xml version="1.0" encoding="utf-8"?>
+<p:notes xmlns:a="http://schemas.openxmlformats.org/drawingml/2006/main" xmlns:r="http://schemas.openxmlformats.org/officeDocument/2006/relationships" xmlns:p="http://schemas.openxmlformats.org/presentationml/2006/main">
+  <p:cSld>
+    <p:spTree>
+      <p:nvGrpSpPr>
+        <p:cNvPr id="1" name=""/>
+        <p:cNvGrpSpPr/>
+        <p:nvPr/>
+      </p:nvGrpSpPr>
+      <p:grpSpPr>
+        <a:xfrm>
+          <a:off x="0" y="0"/>
+          <a:ext cx="0" cy="0"/>
+          <a:chOff x="0" y="0"/>
+          <a:chExt cx="0" cy="0"/>
+        </a:xfrm>
+      </p:grpSpPr>
+      <p:sp>
+        <p:nvSpPr>
+          <p:cNvPr id="2" name="Slide Image Placeholder 1"/>
+          <p:cNvSpPr>
+            <a:spLocks noGrp="1" noRot="1" noChangeAspect="1"/>
+          </p:cNvSpPr>
+          <p:nvPr>
+            <p:ph type="sldImg"/>
+          </p:nvPr>
+        </p:nvSpPr>
+        <p:spPr/>
+      </p:sp>
+      <p:sp>
+        <p:nvSpPr>
+          <p:cNvPr id="3" name="Notes Placeholder 2"/>
+          <p:cNvSpPr>
+            <a:spLocks noGrp="1"/>
+          </p:cNvSpPr>
+          <p:nvPr>
+            <p:ph type="body" idx="1"/>
+          </p:nvPr>
+        </p:nvSpPr>
+        <p:spPr/>
+        <p:txBody>
+          <a:bodyPr>
+            <a:normAutofit/>
+          </a:bodyPr>
+          <a:lstStyle/>
+          <a:p>
+            <a:endParaRPr lang="en-US" dirty="0" smtClean="0"/>
+          </a:p>
+        </p:txBody>
+      </p:sp>
+      <p:sp>
+        <p:nvSpPr>
+          <p:cNvPr id="4" name="Slide Number Placeholder 3"/>
+          <p:cNvSpPr>
+            <a:spLocks noGrp="1"/>
+          </p:cNvSpPr>
+          <p:nvPr>
+            <p:ph type="sldNum" sz="quarter" idx="10"/>
+          </p:nvPr>
+        </p:nvSpPr>
+        <p:spPr/>
+        <p:txBody>
+          <a:bodyPr/>
+          <a:lstStyle/>
+          <a:p>
+            <a:fld id="{1F1EA7EA-3873-4A18-AC34-55CD348F4F74}" type="slidenum">
+              <a:rPr lang="en-US" smtClean="0"/>
+              <a:pPr/>
+              <a:t>17</a:t>
+            </a:fld>
+            <a:endParaRPr lang="en-US"/>
+          </a:p>
+        </p:txBody>
+      </p:sp>
+    </p:spTree>
+  </p:cSld>
+  <p:clrMapOvr>
+    <a:masterClrMapping/>
+  </p:clrMapOvr>
+</p:notes>
+</file>
+
+<file path=ppt/notesSlides/notesSlide16.xml><?xml version="1.0" encoding="utf-8"?>
+<p:notes xmlns:a="http://schemas.openxmlformats.org/drawingml/2006/main" xmlns:r="http://schemas.openxmlformats.org/officeDocument/2006/relationships" xmlns:p="http://schemas.openxmlformats.org/presentationml/2006/main">
+  <p:cSld>
+    <p:spTree>
+      <p:nvGrpSpPr>
+        <p:cNvPr id="1" name=""/>
+        <p:cNvGrpSpPr/>
+        <p:nvPr/>
+      </p:nvGrpSpPr>
+      <p:grpSpPr>
+        <a:xfrm>
+          <a:off x="0" y="0"/>
+          <a:ext cx="0" cy="0"/>
+          <a:chOff x="0" y="0"/>
+          <a:chExt cx="0" cy="0"/>
+        </a:xfrm>
+      </p:grpSpPr>
+      <p:sp>
+        <p:nvSpPr>
+          <p:cNvPr id="2" name="Slide Image Placeholder 1"/>
+          <p:cNvSpPr>
+            <a:spLocks noGrp="1" noRot="1" noChangeAspect="1"/>
+          </p:cNvSpPr>
+          <p:nvPr>
+            <p:ph type="sldImg"/>
+          </p:nvPr>
+        </p:nvSpPr>
+        <p:spPr/>
+      </p:sp>
+      <p:sp>
+        <p:nvSpPr>
+          <p:cNvPr id="3" name="Notes Placeholder 2"/>
+          <p:cNvSpPr>
+            <a:spLocks noGrp="1"/>
+          </p:cNvSpPr>
+          <p:nvPr>
+            <p:ph type="body" idx="1"/>
+          </p:nvPr>
+        </p:nvSpPr>
+        <p:spPr/>
+        <p:txBody>
+          <a:bodyPr>
+            <a:normAutofit/>
+          </a:bodyPr>
+          <a:lstStyle/>
+          <a:p>
+            <a:endParaRPr lang="en-CA" dirty="0"/>
+          </a:p>
+        </p:txBody>
+      </p:sp>
+      <p:sp>
+        <p:nvSpPr>
+          <p:cNvPr id="4" name="Slide Number Placeholder 3"/>
+          <p:cNvSpPr>
+            <a:spLocks noGrp="1"/>
+          </p:cNvSpPr>
+          <p:nvPr>
+            <p:ph type="sldNum" sz="quarter" idx="10"/>
+          </p:nvPr>
+        </p:nvSpPr>
+        <p:spPr/>
+        <p:txBody>
+          <a:bodyPr/>
+          <a:lstStyle/>
+          <a:p>
+            <a:fld id="{1F1EA7EA-3873-4A18-AC34-55CD348F4F74}" type="slidenum">
+              <a:rPr lang="en-US" smtClean="0"/>
+              <a:pPr/>
+              <a:t>18</a:t>
             </a:fld>
             <a:endParaRPr lang="en-US"/>
           </a:p>
@@ -6489,9 +6655,46 @@
           </a:p>
         </p:txBody>
       </p:sp>
+      <p:sp>
+        <p:nvSpPr>
+          <p:cNvPr id="5" name="Title 1"/>
+          <p:cNvSpPr>
+            <a:spLocks noGrp="1"/>
+          </p:cNvSpPr>
+          <p:nvPr>
+            <p:ph type="title"/>
+          </p:nvPr>
+        </p:nvSpPr>
+        <p:spPr>
+          <a:xfrm>
+            <a:off x="228600" y="0"/>
+            <a:ext cx="8686800" cy="1143000"/>
+          </a:xfrm>
+        </p:spPr>
+        <p:txBody>
+          <a:bodyPr/>
+          <a:lstStyle/>
+          <a:p>
+            <a:pPr algn="l"/>
+            <a:r>
+              <a:rPr lang="en-CA" sz="3600" b="1" dirty="0" smtClean="0">
+                <a:solidFill>
+                  <a:schemeClr val="tx2"/>
+                </a:solidFill>
+              </a:rPr>
+              <a:t>DVH plot</a:t>
+            </a:r>
+            <a:endParaRPr lang="en-CA" sz="3600" b="1" dirty="0">
+              <a:solidFill>
+                <a:schemeClr val="tx2"/>
+              </a:solidFill>
+            </a:endParaRPr>
+          </a:p>
+        </p:txBody>
+      </p:sp>
       <p:pic>
         <p:nvPicPr>
-          <p:cNvPr id="1028" name="Picture 4" descr="C:\Users\lasso\Desktop\DvhPlot.png"/>
+          <p:cNvPr id="5122" name="Picture 2"/>
           <p:cNvPicPr>
             <a:picLocks noChangeAspect="1" noChangeArrowheads="1"/>
           </p:cNvPicPr>
@@ -6512,61 +6715,47 @@
         </p:blipFill>
         <p:spPr bwMode="auto">
           <a:xfrm>
-            <a:off x="3614057" y="1938347"/>
-            <a:ext cx="5227765" cy="4006808"/>
+            <a:off x="3048000" y="1852627"/>
+            <a:ext cx="5848350" cy="4167173"/>
           </a:xfrm>
           <a:prstGeom prst="rect">
             <a:avLst/>
           </a:prstGeom>
           <a:noFill/>
+          <a:ln>
+            <a:noFill/>
+          </a:ln>
+          <a:effectLst/>
           <a:extLst>
             <a:ext uri="{909E8E84-426E-40DD-AFC4-6F175D3DCCD1}">
               <a14:hiddenFill xmlns:a14="http://schemas.microsoft.com/office/drawing/2010/main">
                 <a:solidFill>
-                  <a:srgbClr val="FFFFFF"/>
+                  <a:schemeClr val="accent1"/>
                 </a:solidFill>
               </a14:hiddenFill>
+            </a:ext>
+            <a:ext uri="{91240B29-F687-4F45-9708-019B960494DF}">
+              <a14:hiddenLine xmlns:a14="http://schemas.microsoft.com/office/drawing/2010/main" w="9525">
+                <a:solidFill>
+                  <a:schemeClr val="tx1"/>
+                </a:solidFill>
+                <a:miter lim="800000"/>
+                <a:headEnd/>
+                <a:tailEnd/>
+              </a14:hiddenLine>
+            </a:ext>
+            <a:ext uri="{AF507438-7753-43E0-B8FC-AC1667EBCBE1}">
+              <a14:hiddenEffects xmlns:a14="http://schemas.microsoft.com/office/drawing/2010/main">
+                <a:effectLst>
+                  <a:outerShdw dist="35921" dir="2700000" algn="ctr" rotWithShape="0">
+                    <a:schemeClr val="bg2"/>
+                  </a:outerShdw>
+                </a:effectLst>
+              </a14:hiddenEffects>
             </a:ext>
           </a:extLst>
         </p:spPr>
       </p:pic>
-      <p:sp>
-        <p:nvSpPr>
-          <p:cNvPr id="5" name="Title 1"/>
-          <p:cNvSpPr>
-            <a:spLocks noGrp="1"/>
-          </p:cNvSpPr>
-          <p:nvPr>
-            <p:ph type="title"/>
-          </p:nvPr>
-        </p:nvSpPr>
-        <p:spPr>
-          <a:xfrm>
-            <a:off x="228600" y="0"/>
-            <a:ext cx="8686800" cy="1143000"/>
-          </a:xfrm>
-        </p:spPr>
-        <p:txBody>
-          <a:bodyPr/>
-          <a:lstStyle/>
-          <a:p>
-            <a:pPr algn="l"/>
-            <a:r>
-              <a:rPr lang="en-CA" sz="3600" b="1" dirty="0" smtClean="0">
-                <a:solidFill>
-                  <a:schemeClr val="tx2"/>
-                </a:solidFill>
-              </a:rPr>
-              <a:t>DVH plot</a:t>
-            </a:r>
-            <a:endParaRPr lang="en-CA" sz="3600" b="1" dirty="0">
-              <a:solidFill>
-                <a:schemeClr val="tx2"/>
-              </a:solidFill>
-            </a:endParaRPr>
-          </a:p>
-        </p:txBody>
-      </p:sp>
     </p:spTree>
     <p:extLst>
       <p:ext uri="{BB962C8B-B14F-4D97-AF65-F5344CB8AC3E}">
@@ -6604,6 +6793,70 @@
           <a:chExt cx="0" cy="0"/>
         </a:xfrm>
       </p:grpSpPr>
+      <p:pic>
+        <p:nvPicPr>
+          <p:cNvPr id="6147" name="Picture 3"/>
+          <p:cNvPicPr>
+            <a:picLocks noChangeAspect="1" noChangeArrowheads="1"/>
+          </p:cNvPicPr>
+          <p:nvPr/>
+        </p:nvPicPr>
+        <p:blipFill>
+          <a:blip r:embed="rId3">
+            <a:extLst>
+              <a:ext uri="{28A0092B-C50C-407E-A947-70E740481C1C}">
+                <a14:useLocalDpi xmlns:a14="http://schemas.microsoft.com/office/drawing/2010/main" val="0"/>
+              </a:ext>
+            </a:extLst>
+          </a:blip>
+          <a:srcRect/>
+          <a:stretch>
+            <a:fillRect/>
+          </a:stretch>
+        </p:blipFill>
+        <p:spPr bwMode="auto">
+          <a:xfrm>
+            <a:off x="2362200" y="914400"/>
+            <a:ext cx="5949010" cy="5360065"/>
+          </a:xfrm>
+          <a:prstGeom prst="rect">
+            <a:avLst/>
+          </a:prstGeom>
+          <a:noFill/>
+          <a:ln>
+            <a:noFill/>
+          </a:ln>
+          <a:effectLst/>
+          <a:extLst>
+            <a:ext uri="{909E8E84-426E-40DD-AFC4-6F175D3DCCD1}">
+              <a14:hiddenFill xmlns:a14="http://schemas.microsoft.com/office/drawing/2010/main">
+                <a:solidFill>
+                  <a:schemeClr val="accent1"/>
+                </a:solidFill>
+              </a14:hiddenFill>
+            </a:ext>
+            <a:ext uri="{91240B29-F687-4F45-9708-019B960494DF}">
+              <a14:hiddenLine xmlns:a14="http://schemas.microsoft.com/office/drawing/2010/main" w="9525">
+                <a:solidFill>
+                  <a:schemeClr val="tx1"/>
+                </a:solidFill>
+                <a:miter lim="800000"/>
+                <a:headEnd/>
+                <a:tailEnd/>
+              </a14:hiddenLine>
+            </a:ext>
+            <a:ext uri="{AF507438-7753-43E0-B8FC-AC1667EBCBE1}">
+              <a14:hiddenEffects xmlns:a14="http://schemas.microsoft.com/office/drawing/2010/main">
+                <a:effectLst>
+                  <a:outerShdw dist="35921" dir="2700000" algn="ctr" rotWithShape="0">
+                    <a:schemeClr val="bg2"/>
+                  </a:outerShdw>
+                </a:effectLst>
+              </a14:hiddenEffects>
+            </a:ext>
+          </a:extLst>
+        </p:spPr>
+      </p:pic>
       <p:sp>
         <p:nvSpPr>
           <p:cNvPr id="2" name="Title 1"/>
@@ -6652,8 +6905,8 @@
         </p:nvSpPr>
         <p:spPr>
           <a:xfrm>
-            <a:off x="685800" y="1219200"/>
-            <a:ext cx="3886200" cy="4800600"/>
+            <a:off x="228600" y="914400"/>
+            <a:ext cx="1905000" cy="4800600"/>
           </a:xfrm>
         </p:spPr>
         <p:txBody>
@@ -6665,7 +6918,15 @@
             </a:pPr>
             <a:r>
               <a:rPr lang="en-CA" sz="2200" dirty="0" smtClean="0"/>
-              <a:t>Computes a weighted sum of selected dose volumes.</a:t>
+              <a:t>Computes </a:t>
+            </a:r>
+            <a:r>
+              <a:rPr lang="en-CA" sz="2200" dirty="0" smtClean="0"/>
+              <a:t>a weighted sum of selected dose </a:t>
+            </a:r>
+            <a:r>
+              <a:rPr lang="en-CA" sz="2200" dirty="0" smtClean="0"/>
+              <a:t>volumes.</a:t>
             </a:r>
           </a:p>
         </p:txBody>
@@ -6705,45 +6966,6 @@
           </a:p>
         </p:txBody>
       </p:sp>
-      <p:pic>
-        <p:nvPicPr>
-          <p:cNvPr id="3074" name="Picture 2" descr="C:\Users\lasso\Desktop\DoseAccumulation.png"/>
-          <p:cNvPicPr>
-            <a:picLocks noChangeAspect="1" noChangeArrowheads="1"/>
-          </p:cNvPicPr>
-          <p:nvPr/>
-        </p:nvPicPr>
-        <p:blipFill rotWithShape="1">
-          <a:blip r:embed="rId3">
-            <a:extLst>
-              <a:ext uri="{28A0092B-C50C-407E-A947-70E740481C1C}">
-                <a14:useLocalDpi xmlns:a14="http://schemas.microsoft.com/office/drawing/2010/main" val="0"/>
-              </a:ext>
-            </a:extLst>
-          </a:blip>
-          <a:srcRect r="57370"/>
-          <a:stretch/>
-        </p:blipFill>
-        <p:spPr bwMode="auto">
-          <a:xfrm>
-            <a:off x="5105400" y="1219199"/>
-            <a:ext cx="3134706" cy="4774893"/>
-          </a:xfrm>
-          <a:prstGeom prst="rect">
-            <a:avLst/>
-          </a:prstGeom>
-          <a:noFill/>
-          <a:extLst>
-            <a:ext uri="{909E8E84-426E-40DD-AFC4-6F175D3DCCD1}">
-              <a14:hiddenFill xmlns:a14="http://schemas.microsoft.com/office/drawing/2010/main">
-                <a:solidFill>
-                  <a:srgbClr val="FFFFFF"/>
-                </a:solidFill>
-              </a14:hiddenFill>
-            </a:ext>
-          </a:extLst>
-        </p:spPr>
-      </p:pic>
     </p:spTree>
   </p:cSld>
   <p:clrMapOvr>
@@ -6797,20 +7019,28 @@
           <a:lstStyle/>
           <a:p>
             <a:r>
-              <a:rPr lang="en-CA" b="1" dirty="0" err="1" smtClean="0">
-                <a:solidFill>
-                  <a:schemeClr val="tx2"/>
-                </a:solidFill>
-              </a:rPr>
-              <a:t>SlicerRT</a:t>
-            </a:r>
-            <a:r>
               <a:rPr lang="en-CA" b="1" dirty="0" smtClean="0">
                 <a:solidFill>
                   <a:schemeClr val="tx2"/>
                 </a:solidFill>
               </a:rPr>
-              <a:t> development plan</a:t>
+              <a:t>Dose </a:t>
+            </a:r>
+            <a:r>
+              <a:rPr lang="en-CA" b="1" dirty="0" smtClean="0">
+                <a:solidFill>
+                  <a:schemeClr val="tx2"/>
+                </a:solidFill>
+              </a:rPr>
+              <a:t>comparison </a:t>
+            </a:r>
+            <a:r>
+              <a:rPr lang="en-CA" b="1" dirty="0" smtClean="0">
+                <a:solidFill>
+                  <a:schemeClr val="tx2"/>
+                </a:solidFill>
+              </a:rPr>
+              <a:t>module</a:t>
             </a:r>
             <a:endParaRPr lang="en-CA" b="1" dirty="0">
               <a:solidFill>
@@ -6832,8 +7062,8 @@
         </p:nvSpPr>
         <p:spPr>
           <a:xfrm>
-            <a:off x="228600" y="1219200"/>
-            <a:ext cx="8686800" cy="4800600"/>
+            <a:off x="304800" y="1143000"/>
+            <a:ext cx="2133600" cy="4800600"/>
           </a:xfrm>
         </p:spPr>
         <p:txBody>
@@ -6845,92 +7075,11 @@
             </a:pPr>
             <a:r>
               <a:rPr lang="en-CA" sz="2200" dirty="0" smtClean="0"/>
-              <a:t>Planned high-level features:</a:t>
-            </a:r>
-          </a:p>
-          <a:p>
+              <a:t>Computes </a:t>
+            </a:r>
             <a:r>
               <a:rPr lang="en-CA" sz="2200" dirty="0" smtClean="0"/>
-              <a:t>Extensive validation, comparison of computation results to commercial TPS software</a:t>
-            </a:r>
-          </a:p>
-          <a:p>
-            <a:r>
-              <a:rPr lang="en-CA" sz="2200" dirty="0" smtClean="0"/>
-              <a:t>Dose volume comparison (gamma, etc.)</a:t>
-            </a:r>
-          </a:p>
-          <a:p>
-            <a:r>
-              <a:rPr lang="en-CA" sz="2200" dirty="0" smtClean="0"/>
-              <a:t>Dose volume histogram comparison</a:t>
-            </a:r>
-          </a:p>
-          <a:p>
-            <a:r>
-              <a:rPr lang="en-CA" sz="2200" dirty="0" smtClean="0"/>
-              <a:t>Structure set comparison</a:t>
-            </a:r>
-          </a:p>
-          <a:p>
-            <a:r>
-              <a:rPr lang="en-CA" sz="2200" dirty="0" err="1" smtClean="0"/>
-              <a:t>Isodose</a:t>
-            </a:r>
-            <a:r>
-              <a:rPr lang="en-CA" sz="2200" dirty="0" smtClean="0"/>
-              <a:t> curve and surface display</a:t>
-            </a:r>
-          </a:p>
-          <a:p>
-            <a:r>
-              <a:rPr lang="en-CA" sz="2200" dirty="0" smtClean="0"/>
-              <a:t>DICOM-RT export</a:t>
-            </a:r>
-            <a:endParaRPr lang="en-CA" sz="2200" dirty="0"/>
-          </a:p>
-          <a:p>
-            <a:r>
-              <a:rPr lang="en-CA" sz="2200" dirty="0" err="1" smtClean="0"/>
-              <a:t>Matlab</a:t>
-            </a:r>
-            <a:r>
-              <a:rPr lang="en-CA" sz="2200" dirty="0" smtClean="0"/>
-              <a:t> bridge: data exchange with </a:t>
-            </a:r>
-            <a:r>
-              <a:rPr lang="en-CA" sz="2200" dirty="0" err="1" smtClean="0"/>
-              <a:t>Matlab</a:t>
-            </a:r>
-            <a:r>
-              <a:rPr lang="en-CA" sz="2200" dirty="0" smtClean="0"/>
-              <a:t>, running </a:t>
-            </a:r>
-            <a:r>
-              <a:rPr lang="en-CA" sz="2200" dirty="0" err="1" smtClean="0"/>
-              <a:t>Matlab</a:t>
-            </a:r>
-            <a:r>
-              <a:rPr lang="en-CA" sz="2200" dirty="0" smtClean="0"/>
-              <a:t> scripts</a:t>
-            </a:r>
-          </a:p>
-          <a:p>
-            <a:endParaRPr lang="en-CA" sz="2200" dirty="0" smtClean="0"/>
-          </a:p>
-          <a:p>
-            <a:pPr marL="0" indent="0">
-              <a:buNone/>
-            </a:pPr>
-            <a:r>
-              <a:rPr lang="en-CA" sz="2200" dirty="0" smtClean="0"/>
-              <a:t>Detailed plan: </a:t>
-            </a:r>
-            <a:r>
-              <a:rPr lang="en-CA" sz="2200" dirty="0" smtClean="0">
-                <a:hlinkClick r:id="rId3"/>
-              </a:rPr>
-              <a:t>https://www.assembla.com/spaces/sparkit/tickets</a:t>
+              <a:t>dose difference using the gamma function</a:t>
             </a:r>
             <a:endParaRPr lang="en-CA" sz="2200" dirty="0" smtClean="0"/>
           </a:p>
@@ -6971,10 +7120,74 @@
           </a:p>
         </p:txBody>
       </p:sp>
+      <p:pic>
+        <p:nvPicPr>
+          <p:cNvPr id="7170" name="Picture 2"/>
+          <p:cNvPicPr>
+            <a:picLocks noChangeAspect="1" noChangeArrowheads="1"/>
+          </p:cNvPicPr>
+          <p:nvPr/>
+        </p:nvPicPr>
+        <p:blipFill>
+          <a:blip r:embed="rId3">
+            <a:extLst>
+              <a:ext uri="{28A0092B-C50C-407E-A947-70E740481C1C}">
+                <a14:useLocalDpi xmlns:a14="http://schemas.microsoft.com/office/drawing/2010/main" val="0"/>
+              </a:ext>
+            </a:extLst>
+          </a:blip>
+          <a:srcRect/>
+          <a:stretch>
+            <a:fillRect/>
+          </a:stretch>
+        </p:blipFill>
+        <p:spPr bwMode="auto">
+          <a:xfrm>
+            <a:off x="2438400" y="1143000"/>
+            <a:ext cx="6353175" cy="5104469"/>
+          </a:xfrm>
+          <a:prstGeom prst="rect">
+            <a:avLst/>
+          </a:prstGeom>
+          <a:noFill/>
+          <a:ln>
+            <a:noFill/>
+          </a:ln>
+          <a:effectLst/>
+          <a:extLst>
+            <a:ext uri="{909E8E84-426E-40DD-AFC4-6F175D3DCCD1}">
+              <a14:hiddenFill xmlns:a14="http://schemas.microsoft.com/office/drawing/2010/main">
+                <a:solidFill>
+                  <a:schemeClr val="accent1"/>
+                </a:solidFill>
+              </a14:hiddenFill>
+            </a:ext>
+            <a:ext uri="{91240B29-F687-4F45-9708-019B960494DF}">
+              <a14:hiddenLine xmlns:a14="http://schemas.microsoft.com/office/drawing/2010/main" w="9525">
+                <a:solidFill>
+                  <a:schemeClr val="tx1"/>
+                </a:solidFill>
+                <a:miter lim="800000"/>
+                <a:headEnd/>
+                <a:tailEnd/>
+              </a14:hiddenLine>
+            </a:ext>
+            <a:ext uri="{AF507438-7753-43E0-B8FC-AC1667EBCBE1}">
+              <a14:hiddenEffects xmlns:a14="http://schemas.microsoft.com/office/drawing/2010/main">
+                <a:effectLst>
+                  <a:outerShdw dist="35921" dir="2700000" algn="ctr" rotWithShape="0">
+                    <a:schemeClr val="bg2"/>
+                  </a:outerShdw>
+                </a:effectLst>
+              </a14:hiddenEffects>
+            </a:ext>
+          </a:extLst>
+        </p:spPr>
+      </p:pic>
     </p:spTree>
     <p:extLst>
       <p:ext uri="{BB962C8B-B14F-4D97-AF65-F5344CB8AC3E}">
-        <p14:creationId xmlns:p14="http://schemas.microsoft.com/office/powerpoint/2010/main" val="3973560920"/>
+        <p14:creationId xmlns:p14="http://schemas.microsoft.com/office/powerpoint/2010/main" val="1045967126"/>
       </p:ext>
     </p:extLst>
   </p:cSld>
@@ -7018,16 +7231,29 @@
             <p:ph type="title"/>
           </p:nvPr>
         </p:nvSpPr>
-        <p:spPr/>
+        <p:spPr>
+          <a:xfrm>
+            <a:off x="457200" y="0"/>
+            <a:ext cx="8229600" cy="1143000"/>
+          </a:xfrm>
+        </p:spPr>
         <p:txBody>
           <a:bodyPr/>
           <a:lstStyle/>
           <a:p>
             <a:r>
-              <a:rPr lang="en-CA" dirty="0" smtClean="0"/>
-              <a:t>More details</a:t>
-            </a:r>
-            <a:endParaRPr lang="en-CA" dirty="0"/>
+              <a:rPr lang="en-CA" b="1" dirty="0" smtClean="0">
+                <a:solidFill>
+                  <a:schemeClr val="tx2"/>
+                </a:solidFill>
+              </a:rPr>
+              <a:t>Isodose module</a:t>
+            </a:r>
+            <a:endParaRPr lang="en-CA" b="1" dirty="0">
+              <a:solidFill>
+                <a:schemeClr val="tx2"/>
+              </a:solidFill>
+            </a:endParaRPr>
           </a:p>
         </p:txBody>
       </p:sp>
@@ -7043,73 +7269,30 @@
         </p:nvSpPr>
         <p:spPr>
           <a:xfrm>
-            <a:off x="228600" y="1828800"/>
-            <a:ext cx="8686800" cy="4068763"/>
+            <a:off x="304800" y="1143000"/>
+            <a:ext cx="2057400" cy="4800600"/>
           </a:xfrm>
         </p:spPr>
         <p:txBody>
           <a:bodyPr/>
           <a:lstStyle/>
           <a:p>
-            <a:r>
-              <a:rPr lang="en-CA" dirty="0" err="1" smtClean="0"/>
-              <a:t>SparKit</a:t>
-            </a:r>
-            <a:r>
-              <a:rPr lang="en-CA" dirty="0" smtClean="0"/>
-              <a:t>: </a:t>
-            </a:r>
-            <a:r>
-              <a:rPr lang="en-CA" dirty="0" smtClean="0">
-                <a:hlinkClick r:id="rId2"/>
-              </a:rPr>
-              <a:t>https://www.assembla.com/spaces/sparkit/</a:t>
-            </a:r>
-            <a:endParaRPr lang="en-CA" dirty="0" smtClean="0"/>
-          </a:p>
-          <a:p>
-            <a:r>
-              <a:rPr lang="en-CA" dirty="0" err="1" smtClean="0"/>
-              <a:t>SlicerRT</a:t>
-            </a:r>
-            <a:r>
-              <a:rPr lang="en-CA" dirty="0" smtClean="0"/>
-              <a:t>:</a:t>
-            </a:r>
-            <a:br>
-              <a:rPr lang="en-CA" dirty="0" smtClean="0"/>
-            </a:br>
-            <a:r>
-              <a:rPr lang="en-CA" sz="2800" dirty="0" smtClean="0">
-                <a:hlinkClick r:id="rId3"/>
-              </a:rPr>
-              <a:t>https://www.assembla.com/spaces/sparkit/wiki/SlicerRt</a:t>
-            </a:r>
-            <a:endParaRPr lang="en-CA" dirty="0" smtClean="0"/>
-          </a:p>
-          <a:p>
-            <a:r>
-              <a:rPr lang="en-CA" dirty="0" smtClean="0"/>
-              <a:t>Questions, feature requests contact:</a:t>
-            </a:r>
-            <a:br>
-              <a:rPr lang="en-CA" dirty="0" smtClean="0"/>
-            </a:br>
-            <a:r>
-              <a:rPr lang="en-CA" dirty="0" smtClean="0"/>
-              <a:t>Andras Lasso (</a:t>
-            </a:r>
-            <a:r>
-              <a:rPr lang="en-CA" dirty="0" smtClean="0">
-                <a:hlinkClick r:id="rId4"/>
-              </a:rPr>
-              <a:t>lasso@cs.queensu.ca</a:t>
-            </a:r>
-            <a:r>
-              <a:rPr lang="en-CA" dirty="0" smtClean="0"/>
-              <a:t>)</a:t>
-            </a:r>
-            <a:endParaRPr lang="en-CA" dirty="0"/>
+            <a:pPr marL="0" indent="0">
+              <a:buNone/>
+            </a:pPr>
+            <a:r>
+              <a:rPr lang="en-US" sz="2200" dirty="0" smtClean="0"/>
+              <a:t>Creates </a:t>
+            </a:r>
+            <a:r>
+              <a:rPr lang="en-US" sz="2200" dirty="0" err="1"/>
+              <a:t>isosurfaces</a:t>
+            </a:r>
+            <a:r>
+              <a:rPr lang="en-US" sz="2200" dirty="0"/>
+              <a:t> from an input dose volume and a series of defined isodose levels</a:t>
+            </a:r>
+            <a:endParaRPr lang="en-CA" sz="2200" dirty="0" smtClean="0"/>
           </a:p>
         </p:txBody>
       </p:sp>
@@ -7148,7 +7331,76 @@
           </a:p>
         </p:txBody>
       </p:sp>
+      <p:pic>
+        <p:nvPicPr>
+          <p:cNvPr id="8194" name="Picture 2"/>
+          <p:cNvPicPr>
+            <a:picLocks noChangeAspect="1" noChangeArrowheads="1"/>
+          </p:cNvPicPr>
+          <p:nvPr/>
+        </p:nvPicPr>
+        <p:blipFill>
+          <a:blip r:embed="rId3">
+            <a:extLst>
+              <a:ext uri="{28A0092B-C50C-407E-A947-70E740481C1C}">
+                <a14:useLocalDpi xmlns:a14="http://schemas.microsoft.com/office/drawing/2010/main" val="0"/>
+              </a:ext>
+            </a:extLst>
+          </a:blip>
+          <a:srcRect/>
+          <a:stretch>
+            <a:fillRect/>
+          </a:stretch>
+        </p:blipFill>
+        <p:spPr bwMode="auto">
+          <a:xfrm>
+            <a:off x="2438400" y="1371600"/>
+            <a:ext cx="6542689" cy="4572000"/>
+          </a:xfrm>
+          <a:prstGeom prst="rect">
+            <a:avLst/>
+          </a:prstGeom>
+          <a:noFill/>
+          <a:ln>
+            <a:noFill/>
+          </a:ln>
+          <a:effectLst/>
+          <a:extLst>
+            <a:ext uri="{909E8E84-426E-40DD-AFC4-6F175D3DCCD1}">
+              <a14:hiddenFill xmlns:a14="http://schemas.microsoft.com/office/drawing/2010/main">
+                <a:solidFill>
+                  <a:schemeClr val="accent1"/>
+                </a:solidFill>
+              </a14:hiddenFill>
+            </a:ext>
+            <a:ext uri="{91240B29-F687-4F45-9708-019B960494DF}">
+              <a14:hiddenLine xmlns:a14="http://schemas.microsoft.com/office/drawing/2010/main" w="9525">
+                <a:solidFill>
+                  <a:schemeClr val="tx1"/>
+                </a:solidFill>
+                <a:miter lim="800000"/>
+                <a:headEnd/>
+                <a:tailEnd/>
+              </a14:hiddenLine>
+            </a:ext>
+            <a:ext uri="{AF507438-7753-43E0-B8FC-AC1667EBCBE1}">
+              <a14:hiddenEffects xmlns:a14="http://schemas.microsoft.com/office/drawing/2010/main">
+                <a:effectLst>
+                  <a:outerShdw dist="35921" dir="2700000" algn="ctr" rotWithShape="0">
+                    <a:schemeClr val="bg2"/>
+                  </a:outerShdw>
+                </a:effectLst>
+              </a14:hiddenEffects>
+            </a:ext>
+          </a:extLst>
+        </p:spPr>
+      </p:pic>
     </p:spTree>
+    <p:extLst>
+      <p:ext uri="{BB962C8B-B14F-4D97-AF65-F5344CB8AC3E}">
+        <p14:creationId xmlns:p14="http://schemas.microsoft.com/office/powerpoint/2010/main" val="3269186069"/>
+      </p:ext>
+    </p:extLst>
   </p:cSld>
   <p:clrMapOvr>
     <a:masterClrMapping/>
@@ -7201,18 +7453,134 @@
           <a:lstStyle/>
           <a:p>
             <a:r>
+              <a:rPr lang="en-CA" b="1" dirty="0" err="1" smtClean="0">
+                <a:solidFill>
+                  <a:schemeClr val="tx2"/>
+                </a:solidFill>
+              </a:rPr>
+              <a:t>SlicerRT</a:t>
+            </a:r>
+            <a:r>
               <a:rPr lang="en-CA" b="1" dirty="0" smtClean="0">
                 <a:solidFill>
                   <a:schemeClr val="tx2"/>
                 </a:solidFill>
               </a:rPr>
-              <a:t>Appendix</a:t>
+              <a:t> development plan</a:t>
             </a:r>
             <a:endParaRPr lang="en-CA" b="1" dirty="0">
               <a:solidFill>
                 <a:schemeClr val="tx2"/>
               </a:solidFill>
             </a:endParaRPr>
+          </a:p>
+        </p:txBody>
+      </p:sp>
+      <p:sp>
+        <p:nvSpPr>
+          <p:cNvPr id="3" name="Content Placeholder 2"/>
+          <p:cNvSpPr>
+            <a:spLocks noGrp="1"/>
+          </p:cNvSpPr>
+          <p:nvPr>
+            <p:ph idx="1"/>
+          </p:nvPr>
+        </p:nvSpPr>
+        <p:spPr>
+          <a:xfrm>
+            <a:off x="228600" y="1219200"/>
+            <a:ext cx="8686800" cy="4800600"/>
+          </a:xfrm>
+        </p:spPr>
+        <p:txBody>
+          <a:bodyPr/>
+          <a:lstStyle/>
+          <a:p>
+            <a:pPr marL="0" indent="0">
+              <a:buNone/>
+            </a:pPr>
+            <a:r>
+              <a:rPr lang="en-CA" sz="2200" dirty="0" smtClean="0"/>
+              <a:t>Planned high-level features:</a:t>
+            </a:r>
+          </a:p>
+          <a:p>
+            <a:r>
+              <a:rPr lang="en-CA" sz="2200" dirty="0" smtClean="0"/>
+              <a:t>Extensive validation, comparison of computation results to commercial TPS software</a:t>
+            </a:r>
+          </a:p>
+          <a:p>
+            <a:r>
+              <a:rPr lang="en-CA" sz="2200" dirty="0" smtClean="0"/>
+              <a:t>Dose </a:t>
+            </a:r>
+            <a:r>
+              <a:rPr lang="en-CA" sz="2200" dirty="0" smtClean="0"/>
+              <a:t>volume histogram comparison</a:t>
+            </a:r>
+          </a:p>
+          <a:p>
+            <a:r>
+              <a:rPr lang="en-CA" sz="2200" dirty="0" smtClean="0"/>
+              <a:t>Structure set comparison</a:t>
+            </a:r>
+          </a:p>
+          <a:p>
+            <a:r>
+              <a:rPr lang="en-CA" sz="2200" dirty="0" smtClean="0"/>
+              <a:t>DICOM-RT </a:t>
+            </a:r>
+            <a:r>
+              <a:rPr lang="en-CA" sz="2200" dirty="0" smtClean="0"/>
+              <a:t>export</a:t>
+            </a:r>
+            <a:endParaRPr lang="en-CA" sz="2200" dirty="0"/>
+          </a:p>
+          <a:p>
+            <a:r>
+              <a:rPr lang="en-CA" sz="2200" dirty="0" err="1" smtClean="0"/>
+              <a:t>Matlab</a:t>
+            </a:r>
+            <a:r>
+              <a:rPr lang="en-CA" sz="2200" dirty="0" smtClean="0"/>
+              <a:t> bridge: data exchange with </a:t>
+            </a:r>
+            <a:r>
+              <a:rPr lang="en-CA" sz="2200" dirty="0" err="1" smtClean="0"/>
+              <a:t>Matlab</a:t>
+            </a:r>
+            <a:r>
+              <a:rPr lang="en-CA" sz="2200" dirty="0" smtClean="0"/>
+              <a:t>, running </a:t>
+            </a:r>
+            <a:r>
+              <a:rPr lang="en-CA" sz="2200" dirty="0" err="1" smtClean="0"/>
+              <a:t>Matlab</a:t>
+            </a:r>
+            <a:r>
+              <a:rPr lang="en-CA" sz="2200" dirty="0" smtClean="0"/>
+              <a:t> scripts</a:t>
+            </a:r>
+          </a:p>
+          <a:p>
+            <a:endParaRPr lang="en-CA" sz="2200" dirty="0" smtClean="0"/>
+          </a:p>
+          <a:p>
+            <a:pPr marL="0" indent="0">
+              <a:buNone/>
+            </a:pPr>
+            <a:r>
+              <a:rPr lang="en-CA" sz="2200" dirty="0" smtClean="0"/>
+              <a:t>Detailed plan: </a:t>
+            </a:r>
+            <a:r>
+              <a:rPr lang="en-CA" sz="2200" dirty="0" smtClean="0">
+                <a:hlinkClick r:id="rId3"/>
+              </a:rPr>
+              <a:t>https://www.assembla.com/spaces/sparkit/tickets</a:t>
+            </a:r>
+            <a:endParaRPr lang="en-CA" sz="2200" dirty="0" smtClean="0"/>
           </a:p>
         </p:txBody>
       </p:sp>
@@ -7254,7 +7622,7 @@
     </p:spTree>
     <p:extLst>
       <p:ext uri="{BB962C8B-B14F-4D97-AF65-F5344CB8AC3E}">
-        <p14:creationId xmlns:p14="http://schemas.microsoft.com/office/powerpoint/2010/main" val="2016591617"/>
+        <p14:creationId xmlns:p14="http://schemas.microsoft.com/office/powerpoint/2010/main" val="3973560920"/>
       </p:ext>
     </p:extLst>
   </p:cSld>
@@ -7290,6 +7658,286 @@
       </p:grpSpPr>
       <p:sp>
         <p:nvSpPr>
+          <p:cNvPr id="2" name="Title 1"/>
+          <p:cNvSpPr>
+            <a:spLocks noGrp="1"/>
+          </p:cNvSpPr>
+          <p:nvPr>
+            <p:ph type="title"/>
+          </p:nvPr>
+        </p:nvSpPr>
+        <p:spPr/>
+        <p:txBody>
+          <a:bodyPr/>
+          <a:lstStyle/>
+          <a:p>
+            <a:r>
+              <a:rPr lang="en-CA" dirty="0" smtClean="0"/>
+              <a:t>More details</a:t>
+            </a:r>
+            <a:endParaRPr lang="en-CA" dirty="0"/>
+          </a:p>
+        </p:txBody>
+      </p:sp>
+      <p:sp>
+        <p:nvSpPr>
+          <p:cNvPr id="3" name="Content Placeholder 2"/>
+          <p:cNvSpPr>
+            <a:spLocks noGrp="1"/>
+          </p:cNvSpPr>
+          <p:nvPr>
+            <p:ph idx="1"/>
+          </p:nvPr>
+        </p:nvSpPr>
+        <p:spPr>
+          <a:xfrm>
+            <a:off x="228600" y="1828800"/>
+            <a:ext cx="8686800" cy="4068763"/>
+          </a:xfrm>
+        </p:spPr>
+        <p:txBody>
+          <a:bodyPr/>
+          <a:lstStyle/>
+          <a:p>
+            <a:r>
+              <a:rPr lang="en-CA" dirty="0" err="1" smtClean="0"/>
+              <a:t>SparKit</a:t>
+            </a:r>
+            <a:r>
+              <a:rPr lang="en-CA" dirty="0" smtClean="0"/>
+              <a:t>: </a:t>
+            </a:r>
+            <a:r>
+              <a:rPr lang="en-CA" dirty="0" smtClean="0">
+                <a:hlinkClick r:id="rId2"/>
+              </a:rPr>
+              <a:t>https://www.assembla.com/spaces/sparkit/</a:t>
+            </a:r>
+            <a:endParaRPr lang="en-CA" dirty="0" smtClean="0"/>
+          </a:p>
+          <a:p>
+            <a:r>
+              <a:rPr lang="en-CA" dirty="0" err="1" smtClean="0"/>
+              <a:t>SlicerRT</a:t>
+            </a:r>
+            <a:r>
+              <a:rPr lang="en-CA" dirty="0" smtClean="0"/>
+              <a:t>:</a:t>
+            </a:r>
+            <a:br>
+              <a:rPr lang="en-CA" dirty="0" smtClean="0"/>
+            </a:br>
+            <a:r>
+              <a:rPr lang="en-CA" sz="2800" dirty="0" smtClean="0">
+                <a:hlinkClick r:id="rId3"/>
+              </a:rPr>
+              <a:t>https://www.assembla.com/spaces/sparkit/wiki/SlicerRt</a:t>
+            </a:r>
+            <a:endParaRPr lang="en-CA" dirty="0" smtClean="0"/>
+          </a:p>
+          <a:p>
+            <a:r>
+              <a:rPr lang="en-CA" dirty="0" smtClean="0"/>
+              <a:t>Questions, feature requests contact:</a:t>
+            </a:r>
+            <a:br>
+              <a:rPr lang="en-CA" dirty="0" smtClean="0"/>
+            </a:br>
+            <a:r>
+              <a:rPr lang="en-CA" dirty="0" smtClean="0"/>
+              <a:t>Andras Lasso (</a:t>
+            </a:r>
+            <a:r>
+              <a:rPr lang="en-CA" dirty="0" smtClean="0">
+                <a:hlinkClick r:id="rId4"/>
+              </a:rPr>
+              <a:t>lasso@cs.queensu.ca</a:t>
+            </a:r>
+            <a:r>
+              <a:rPr lang="en-CA" dirty="0" smtClean="0"/>
+              <a:t>)</a:t>
+            </a:r>
+            <a:endParaRPr lang="en-CA" dirty="0"/>
+          </a:p>
+        </p:txBody>
+      </p:sp>
+      <p:sp>
+        <p:nvSpPr>
+          <p:cNvPr id="5" name="Footer Placeholder 10"/>
+          <p:cNvSpPr>
+            <a:spLocks noGrp="1"/>
+          </p:cNvSpPr>
+          <p:nvPr>
+            <p:ph type="ftr" sz="quarter" idx="11"/>
+          </p:nvPr>
+        </p:nvSpPr>
+        <p:spPr>
+          <a:xfrm>
+            <a:off x="1905000" y="6356350"/>
+            <a:ext cx="5257800" cy="365125"/>
+          </a:xfrm>
+        </p:spPr>
+        <p:txBody>
+          <a:bodyPr/>
+          <a:lstStyle>
+            <a:lvl1pPr>
+              <a:defRPr/>
+            </a:lvl1pPr>
+          </a:lstStyle>
+          <a:p>
+            <a:pPr>
+              <a:defRPr/>
+            </a:pPr>
+            <a:r>
+              <a:rPr lang="en-US" dirty="0" smtClean="0"/>
+              <a:t>Laboratory for Percutaneous Surgery – Copyright © Queen’s University, 2012</a:t>
+            </a:r>
+            <a:endParaRPr lang="en-US" dirty="0"/>
+          </a:p>
+        </p:txBody>
+      </p:sp>
+    </p:spTree>
+  </p:cSld>
+  <p:clrMapOvr>
+    <a:masterClrMapping/>
+  </p:clrMapOvr>
+  <p:timing>
+    <p:tnLst>
+      <p:par>
+        <p:cTn id="1" dur="indefinite" restart="never" nodeType="tmRoot"/>
+      </p:par>
+    </p:tnLst>
+  </p:timing>
+</p:sld>
+</file>
+
+<file path=ppt/slides/slide16.xml><?xml version="1.0" encoding="utf-8"?>
+<p:sld xmlns:a="http://schemas.openxmlformats.org/drawingml/2006/main" xmlns:r="http://schemas.openxmlformats.org/officeDocument/2006/relationships" xmlns:p="http://schemas.openxmlformats.org/presentationml/2006/main">
+  <p:cSld>
+    <p:spTree>
+      <p:nvGrpSpPr>
+        <p:cNvPr id="1" name=""/>
+        <p:cNvGrpSpPr/>
+        <p:nvPr/>
+      </p:nvGrpSpPr>
+      <p:grpSpPr>
+        <a:xfrm>
+          <a:off x="0" y="0"/>
+          <a:ext cx="0" cy="0"/>
+          <a:chOff x="0" y="0"/>
+          <a:chExt cx="0" cy="0"/>
+        </a:xfrm>
+      </p:grpSpPr>
+      <p:sp>
+        <p:nvSpPr>
+          <p:cNvPr id="2" name="Title 1"/>
+          <p:cNvSpPr>
+            <a:spLocks noGrp="1"/>
+          </p:cNvSpPr>
+          <p:nvPr>
+            <p:ph type="title"/>
+          </p:nvPr>
+        </p:nvSpPr>
+        <p:spPr>
+          <a:xfrm>
+            <a:off x="457200" y="0"/>
+            <a:ext cx="8229600" cy="1143000"/>
+          </a:xfrm>
+        </p:spPr>
+        <p:txBody>
+          <a:bodyPr/>
+          <a:lstStyle/>
+          <a:p>
+            <a:r>
+              <a:rPr lang="en-CA" b="1" dirty="0" smtClean="0">
+                <a:solidFill>
+                  <a:schemeClr val="tx2"/>
+                </a:solidFill>
+              </a:rPr>
+              <a:t>Appendix</a:t>
+            </a:r>
+            <a:endParaRPr lang="en-CA" b="1" dirty="0">
+              <a:solidFill>
+                <a:schemeClr val="tx2"/>
+              </a:solidFill>
+            </a:endParaRPr>
+          </a:p>
+        </p:txBody>
+      </p:sp>
+      <p:sp>
+        <p:nvSpPr>
+          <p:cNvPr id="5" name="Footer Placeholder 10"/>
+          <p:cNvSpPr>
+            <a:spLocks noGrp="1"/>
+          </p:cNvSpPr>
+          <p:nvPr>
+            <p:ph type="ftr" sz="quarter" idx="11"/>
+          </p:nvPr>
+        </p:nvSpPr>
+        <p:spPr>
+          <a:xfrm>
+            <a:off x="1905000" y="6356350"/>
+            <a:ext cx="5257800" cy="365125"/>
+          </a:xfrm>
+        </p:spPr>
+        <p:txBody>
+          <a:bodyPr/>
+          <a:lstStyle>
+            <a:lvl1pPr>
+              <a:defRPr/>
+            </a:lvl1pPr>
+          </a:lstStyle>
+          <a:p>
+            <a:pPr>
+              <a:defRPr/>
+            </a:pPr>
+            <a:r>
+              <a:rPr lang="en-US" dirty="0" smtClean="0"/>
+              <a:t>Laboratory for Percutaneous Surgery – Copyright © Queen’s University, 2012</a:t>
+            </a:r>
+            <a:endParaRPr lang="en-US" dirty="0"/>
+          </a:p>
+        </p:txBody>
+      </p:sp>
+    </p:spTree>
+    <p:extLst>
+      <p:ext uri="{BB962C8B-B14F-4D97-AF65-F5344CB8AC3E}">
+        <p14:creationId xmlns:p14="http://schemas.microsoft.com/office/powerpoint/2010/main" val="2016591617"/>
+      </p:ext>
+    </p:extLst>
+  </p:cSld>
+  <p:clrMapOvr>
+    <a:masterClrMapping/>
+  </p:clrMapOvr>
+  <p:timing>
+    <p:tnLst>
+      <p:par>
+        <p:cTn id="1" dur="indefinite" restart="never" nodeType="tmRoot"/>
+      </p:par>
+    </p:tnLst>
+  </p:timing>
+</p:sld>
+</file>
+
+<file path=ppt/slides/slide17.xml><?xml version="1.0" encoding="utf-8"?>
+<p:sld xmlns:a="http://schemas.openxmlformats.org/drawingml/2006/main" xmlns:r="http://schemas.openxmlformats.org/officeDocument/2006/relationships" xmlns:p="http://schemas.openxmlformats.org/presentationml/2006/main">
+  <p:cSld>
+    <p:spTree>
+      <p:nvGrpSpPr>
+        <p:cNvPr id="1" name=""/>
+        <p:cNvGrpSpPr/>
+        <p:nvPr/>
+      </p:nvGrpSpPr>
+      <p:grpSpPr>
+        <a:xfrm>
+          <a:off x="0" y="0"/>
+          <a:ext cx="0" cy="0"/>
+          <a:chOff x="0" y="0"/>
+          <a:chExt cx="0" cy="0"/>
+        </a:xfrm>
+      </p:grpSpPr>
+      <p:sp>
+        <p:nvSpPr>
           <p:cNvPr id="3" name="Content Placeholder 2"/>
           <p:cNvSpPr>
             <a:spLocks noGrp="1"/>
@@ -7472,7 +8120,7 @@
               <a:pPr>
                 <a:defRPr/>
               </a:pPr>
-              <a:t>15</a:t>
+              <a:t>17</a:t>
             </a:fld>
             <a:r>
               <a:rPr lang="en-US" dirty="0"/>
@@ -7597,7 +8245,7 @@
 </p:sld>
 </file>
 
-<file path=ppt/slides/slide16.xml><?xml version="1.0" encoding="utf-8"?>
+<file path=ppt/slides/slide18.xml><?xml version="1.0" encoding="utf-8"?>
 <p:sld xmlns:a="http://schemas.openxmlformats.org/drawingml/2006/main" xmlns:r="http://schemas.openxmlformats.org/officeDocument/2006/relationships" xmlns:p="http://schemas.openxmlformats.org/presentationml/2006/main">
   <p:cSld>
     <p:spTree>
@@ -7650,7 +8298,7 @@
               <a:pPr>
                 <a:defRPr/>
               </a:pPr>
-              <a:t>16</a:t>
+              <a:t>18</a:t>
             </a:fld>
             <a:r>
               <a:rPr lang="en-US" dirty="0"/>
@@ -10228,16 +10876,7 @@
                           </a:solidFill>
                           <a:latin typeface="+mn-lt"/>
                         </a:rPr>
-                        <a:t>Not available </a:t>
-                      </a:r>
-                      <a:r>
-                        <a:rPr lang="en-CA" sz="900" b="0" i="0" u="none" strike="noStrike" dirty="0" smtClean="0">
-                          <a:solidFill>
-                            <a:srgbClr val="000000"/>
-                          </a:solidFill>
-                          <a:latin typeface="+mn-lt"/>
-                        </a:rPr>
-                        <a:t>yet</a:t>
+                        <a:t>Not available yet</a:t>
                       </a:r>
                       <a:endParaRPr lang="en-CA" sz="900" b="0" i="0" u="none" strike="noStrike" dirty="0">
                         <a:solidFill>
@@ -10422,16 +11061,7 @@
                           </a:solidFill>
                           <a:latin typeface="+mn-lt"/>
                         </a:rPr>
-                        <a:t>Not available </a:t>
-                      </a:r>
-                      <a:r>
-                        <a:rPr lang="en-CA" sz="900" b="0" i="0" u="none" strike="noStrike" dirty="0" smtClean="0">
-                          <a:solidFill>
-                            <a:srgbClr val="000000"/>
-                          </a:solidFill>
-                          <a:latin typeface="+mn-lt"/>
-                        </a:rPr>
-                        <a:t>yet</a:t>
+                        <a:t>Not available yet</a:t>
                       </a:r>
                       <a:endParaRPr lang="en-CA" sz="900" b="0" i="0" u="none" strike="noStrike" dirty="0">
                         <a:solidFill>
@@ -11252,25 +11882,7 @@
                           </a:solidFill>
                           <a:latin typeface="Calibri"/>
                         </a:rPr>
-                        <a:t>Yes, DSH </a:t>
-                      </a:r>
-                      <a:r>
-                        <a:rPr lang="en-CA" sz="900" b="0" i="0" u="none" strike="noStrike" dirty="0" smtClean="0">
-                          <a:solidFill>
-                            <a:srgbClr val="000000"/>
-                          </a:solidFill>
-                          <a:latin typeface="Calibri"/>
-                        </a:rPr>
-                        <a:t>not </a:t>
-                      </a:r>
-                      <a:r>
-                        <a:rPr lang="en-CA" sz="900" b="0" i="0" u="none" strike="noStrike" dirty="0" smtClean="0">
-                          <a:solidFill>
-                            <a:srgbClr val="000000"/>
-                          </a:solidFill>
-                          <a:latin typeface="Calibri"/>
-                        </a:rPr>
-                        <a:t>yet  available</a:t>
+                        <a:t>Yes, DSH not yet  available</a:t>
                       </a:r>
                       <a:br>
                         <a:rPr lang="en-CA" sz="900" b="0" i="0" u="none" strike="noStrike" dirty="0" smtClean="0">
@@ -14936,8 +15548,13 @@
             <a:pPr lvl="1"/>
             <a:r>
               <a:rPr lang="en-CA" sz="2200" dirty="0" smtClean="0"/>
-              <a:t>Develop missing RT-specific functionalities: DVH analysis, ...</a:t>
-            </a:r>
+              <a:t>Develop missing RT-specific functionalities: DVH analysis, </a:t>
+            </a:r>
+            <a:r>
+              <a:rPr lang="en-CA" sz="2200" dirty="0" smtClean="0"/>
+              <a:t>...</a:t>
+            </a:r>
+            <a:endParaRPr lang="en-CA" sz="2200" dirty="0" smtClean="0"/>
           </a:p>
           <a:p>
             <a:pPr lvl="1"/>
@@ -15090,11 +15707,7 @@
           <a:p>
             <a:r>
               <a:rPr lang="en-CA" sz="2200" dirty="0" smtClean="0"/>
-              <a:t>Distributed as a 3D Slicer extension: can be downloaded, installed, upgraded using the extension manager in </a:t>
-            </a:r>
-            <a:r>
-              <a:rPr lang="en-CA" sz="2200" dirty="0" smtClean="0"/>
-              <a:t>Slicer</a:t>
+              <a:t>Distributed as a 3D Slicer extension: can be downloaded, installed, upgraded using the extension manager in Slicer</a:t>
             </a:r>
           </a:p>
           <a:p>
@@ -15102,7 +15715,6 @@
               <a:rPr lang="en-CA" sz="2200" dirty="0" smtClean="0"/>
               <a:t>Extensive automatic testing done on multiple platforms</a:t>
             </a:r>
-            <a:endParaRPr lang="en-CA" sz="2200" dirty="0" smtClean="0"/>
           </a:p>
         </p:txBody>
       </p:sp>
@@ -15414,7 +16026,6 @@
               <a:rPr lang="en-CA" sz="1400" dirty="0" smtClean="0"/>
               <a:t>Dashboard showing automatic test results</a:t>
             </a:r>
-            <a:endParaRPr lang="en-CA" sz="1400" dirty="0" smtClean="0"/>
           </a:p>
         </p:txBody>
       </p:sp>
@@ -15613,7 +16224,6 @@
               <a:rPr lang="en-CA" sz="1400" dirty="0" smtClean="0"/>
               <a:t> in the 3D Slicer app store (free)</a:t>
             </a:r>
-            <a:endParaRPr lang="en-CA" sz="1400" dirty="0" smtClean="0"/>
           </a:p>
         </p:txBody>
       </p:sp>
@@ -15946,38 +16556,6 @@
           <a:chExt cx="0" cy="0"/>
         </a:xfrm>
       </p:grpSpPr>
-      <p:pic>
-        <p:nvPicPr>
-          <p:cNvPr id="2050" name="Picture 2"/>
-          <p:cNvPicPr>
-            <a:picLocks noChangeAspect="1" noChangeArrowheads="1"/>
-          </p:cNvPicPr>
-          <p:nvPr/>
-        </p:nvPicPr>
-        <p:blipFill>
-          <a:blip r:embed="rId3" cstate="print"/>
-          <a:srcRect r="5745" b="7353"/>
-          <a:stretch>
-            <a:fillRect/>
-          </a:stretch>
-        </p:blipFill>
-        <p:spPr bwMode="auto">
-          <a:xfrm>
-            <a:off x="228600" y="1066800"/>
-            <a:ext cx="8686800" cy="4800600"/>
-          </a:xfrm>
-          <a:prstGeom prst="rect">
-            <a:avLst/>
-          </a:prstGeom>
-          <a:noFill/>
-          <a:ln w="9525">
-            <a:noFill/>
-            <a:miter lim="800000"/>
-            <a:headEnd/>
-            <a:tailEnd/>
-          </a:ln>
-        </p:spPr>
-      </p:pic>
       <p:sp>
         <p:nvSpPr>
           <p:cNvPr id="10" name="Title 1"/>
@@ -16049,6 +16627,70 @@
           </a:p>
         </p:txBody>
       </p:sp>
+      <p:pic>
+        <p:nvPicPr>
+          <p:cNvPr id="1026" name="Picture 2"/>
+          <p:cNvPicPr>
+            <a:picLocks noChangeAspect="1" noChangeArrowheads="1"/>
+          </p:cNvPicPr>
+          <p:nvPr/>
+        </p:nvPicPr>
+        <p:blipFill>
+          <a:blip r:embed="rId3">
+            <a:extLst>
+              <a:ext uri="{28A0092B-C50C-407E-A947-70E740481C1C}">
+                <a14:useLocalDpi xmlns:a14="http://schemas.microsoft.com/office/drawing/2010/main" val="0"/>
+              </a:ext>
+            </a:extLst>
+          </a:blip>
+          <a:srcRect/>
+          <a:stretch>
+            <a:fillRect/>
+          </a:stretch>
+        </p:blipFill>
+        <p:spPr bwMode="auto">
+          <a:xfrm>
+            <a:off x="228600" y="990600"/>
+            <a:ext cx="8581302" cy="4648200"/>
+          </a:xfrm>
+          <a:prstGeom prst="rect">
+            <a:avLst/>
+          </a:prstGeom>
+          <a:noFill/>
+          <a:ln>
+            <a:noFill/>
+          </a:ln>
+          <a:effectLst/>
+          <a:extLst>
+            <a:ext uri="{909E8E84-426E-40DD-AFC4-6F175D3DCCD1}">
+              <a14:hiddenFill xmlns:a14="http://schemas.microsoft.com/office/drawing/2010/main">
+                <a:solidFill>
+                  <a:schemeClr val="accent1"/>
+                </a:solidFill>
+              </a14:hiddenFill>
+            </a:ext>
+            <a:ext uri="{91240B29-F687-4F45-9708-019B960494DF}">
+              <a14:hiddenLine xmlns:a14="http://schemas.microsoft.com/office/drawing/2010/main" w="9525">
+                <a:solidFill>
+                  <a:schemeClr val="tx1"/>
+                </a:solidFill>
+                <a:miter lim="800000"/>
+                <a:headEnd/>
+                <a:tailEnd/>
+              </a14:hiddenLine>
+            </a:ext>
+            <a:ext uri="{AF507438-7753-43E0-B8FC-AC1667EBCBE1}">
+              <a14:hiddenEffects xmlns:a14="http://schemas.microsoft.com/office/drawing/2010/main">
+                <a:effectLst>
+                  <a:outerShdw dist="35921" dir="2700000" algn="ctr" rotWithShape="0">
+                    <a:schemeClr val="bg2"/>
+                  </a:outerShdw>
+                </a:effectLst>
+              </a14:hiddenEffects>
+            </a:ext>
+          </a:extLst>
+        </p:spPr>
+      </p:pic>
     </p:spTree>
   </p:cSld>
   <p:clrMapOvr>
@@ -16118,70 +16760,6 @@
           </a:p>
         </p:txBody>
       </p:sp>
-      <p:pic>
-        <p:nvPicPr>
-          <p:cNvPr id="3074" name="Picture 2"/>
-          <p:cNvPicPr>
-            <a:picLocks noChangeAspect="1" noChangeArrowheads="1"/>
-          </p:cNvPicPr>
-          <p:nvPr/>
-        </p:nvPicPr>
-        <p:blipFill>
-          <a:blip r:embed="rId3" cstate="print"/>
-          <a:srcRect l="43614" t="10417" b="8333"/>
-          <a:stretch>
-            <a:fillRect/>
-          </a:stretch>
-        </p:blipFill>
-        <p:spPr bwMode="auto">
-          <a:xfrm>
-            <a:off x="457200" y="3124200"/>
-            <a:ext cx="3276600" cy="2824031"/>
-          </a:xfrm>
-          <a:prstGeom prst="rect">
-            <a:avLst/>
-          </a:prstGeom>
-          <a:noFill/>
-          <a:ln w="9525">
-            <a:noFill/>
-            <a:miter lim="800000"/>
-            <a:headEnd/>
-            <a:tailEnd/>
-          </a:ln>
-        </p:spPr>
-      </p:pic>
-      <p:pic>
-        <p:nvPicPr>
-          <p:cNvPr id="3075" name="Picture 3"/>
-          <p:cNvPicPr>
-            <a:picLocks noChangeAspect="1" noChangeArrowheads="1"/>
-          </p:cNvPicPr>
-          <p:nvPr/>
-        </p:nvPicPr>
-        <p:blipFill>
-          <a:blip r:embed="rId4" cstate="print"/>
-          <a:srcRect l="43614" t="10417" b="8333"/>
-          <a:stretch>
-            <a:fillRect/>
-          </a:stretch>
-        </p:blipFill>
-        <p:spPr bwMode="auto">
-          <a:xfrm>
-            <a:off x="2819400" y="1219200"/>
-            <a:ext cx="3276600" cy="2824031"/>
-          </a:xfrm>
-          <a:prstGeom prst="rect">
-            <a:avLst/>
-          </a:prstGeom>
-          <a:noFill/>
-          <a:ln w="9525">
-            <a:noFill/>
-            <a:miter lim="800000"/>
-            <a:headEnd/>
-            <a:tailEnd/>
-          </a:ln>
-        </p:spPr>
-      </p:pic>
       <p:sp>
         <p:nvSpPr>
           <p:cNvPr id="8" name="Content Placeholder 2"/>
@@ -16194,7 +16772,7 @@
         </p:nvSpPr>
         <p:spPr>
           <a:xfrm>
-            <a:off x="381000" y="2057400"/>
+            <a:off x="287044" y="2514600"/>
             <a:ext cx="2209800" cy="1219200"/>
           </a:xfrm>
         </p:spPr>
@@ -16222,7 +16800,7 @@
         </p:nvSpPr>
         <p:spPr bwMode="auto">
           <a:xfrm>
-            <a:off x="3810000" y="5181600"/>
+            <a:off x="4038600" y="5181600"/>
             <a:ext cx="1676400" cy="1219200"/>
           </a:xfrm>
           <a:prstGeom prst="rect">
@@ -16312,38 +16890,6 @@
           </a:p>
         </p:txBody>
       </p:sp>
-      <p:pic>
-        <p:nvPicPr>
-          <p:cNvPr id="3077" name="Picture 5"/>
-          <p:cNvPicPr>
-            <a:picLocks noChangeAspect="1" noChangeArrowheads="1"/>
-          </p:cNvPicPr>
-          <p:nvPr/>
-        </p:nvPicPr>
-        <p:blipFill>
-          <a:blip r:embed="rId5" cstate="print"/>
-          <a:srcRect l="43614" t="10417" b="9375"/>
-          <a:stretch>
-            <a:fillRect/>
-          </a:stretch>
-        </p:blipFill>
-        <p:spPr bwMode="auto">
-          <a:xfrm>
-            <a:off x="5498770" y="3200400"/>
-            <a:ext cx="3492830" cy="2971800"/>
-          </a:xfrm>
-          <a:prstGeom prst="rect">
-            <a:avLst/>
-          </a:prstGeom>
-          <a:noFill/>
-          <a:ln w="9525">
-            <a:noFill/>
-            <a:miter lim="800000"/>
-            <a:headEnd/>
-            <a:tailEnd/>
-          </a:ln>
-        </p:spPr>
-      </p:pic>
       <p:sp>
         <p:nvSpPr>
           <p:cNvPr id="11" name="Content Placeholder 2"/>
@@ -16354,7 +16900,7 @@
         </p:nvSpPr>
         <p:spPr bwMode="auto">
           <a:xfrm>
-            <a:off x="6096000" y="1143000"/>
+            <a:off x="6122634" y="1143000"/>
             <a:ext cx="2209800" cy="1219200"/>
           </a:xfrm>
           <a:prstGeom prst="rect">
@@ -16448,6 +16994,198 @@
           </a:p>
         </p:txBody>
       </p:sp>
+      <p:pic>
+        <p:nvPicPr>
+          <p:cNvPr id="2050" name="Picture 2"/>
+          <p:cNvPicPr>
+            <a:picLocks noChangeAspect="1" noChangeArrowheads="1"/>
+          </p:cNvPicPr>
+          <p:nvPr/>
+        </p:nvPicPr>
+        <p:blipFill>
+          <a:blip r:embed="rId3">
+            <a:extLst>
+              <a:ext uri="{28A0092B-C50C-407E-A947-70E740481C1C}">
+                <a14:useLocalDpi xmlns:a14="http://schemas.microsoft.com/office/drawing/2010/main" val="0"/>
+              </a:ext>
+            </a:extLst>
+          </a:blip>
+          <a:srcRect/>
+          <a:stretch>
+            <a:fillRect/>
+          </a:stretch>
+        </p:blipFill>
+        <p:spPr bwMode="auto">
+          <a:xfrm>
+            <a:off x="377452" y="3581400"/>
+            <a:ext cx="3661148" cy="2479246"/>
+          </a:xfrm>
+          <a:prstGeom prst="rect">
+            <a:avLst/>
+          </a:prstGeom>
+          <a:noFill/>
+          <a:ln>
+            <a:noFill/>
+          </a:ln>
+          <a:effectLst/>
+          <a:extLst>
+            <a:ext uri="{909E8E84-426E-40DD-AFC4-6F175D3DCCD1}">
+              <a14:hiddenFill xmlns:a14="http://schemas.microsoft.com/office/drawing/2010/main">
+                <a:solidFill>
+                  <a:schemeClr val="accent1"/>
+                </a:solidFill>
+              </a14:hiddenFill>
+            </a:ext>
+            <a:ext uri="{91240B29-F687-4F45-9708-019B960494DF}">
+              <a14:hiddenLine xmlns:a14="http://schemas.microsoft.com/office/drawing/2010/main" w="9525">
+                <a:solidFill>
+                  <a:schemeClr val="tx1"/>
+                </a:solidFill>
+                <a:miter lim="800000"/>
+                <a:headEnd/>
+                <a:tailEnd/>
+              </a14:hiddenLine>
+            </a:ext>
+            <a:ext uri="{AF507438-7753-43E0-B8FC-AC1667EBCBE1}">
+              <a14:hiddenEffects xmlns:a14="http://schemas.microsoft.com/office/drawing/2010/main">
+                <a:effectLst>
+                  <a:outerShdw dist="35921" dir="2700000" algn="ctr" rotWithShape="0">
+                    <a:schemeClr val="bg2"/>
+                  </a:outerShdw>
+                </a:effectLst>
+              </a14:hiddenEffects>
+            </a:ext>
+          </a:extLst>
+        </p:spPr>
+      </p:pic>
+      <p:pic>
+        <p:nvPicPr>
+          <p:cNvPr id="2052" name="Picture 4"/>
+          <p:cNvPicPr>
+            <a:picLocks noChangeAspect="1" noChangeArrowheads="1"/>
+          </p:cNvPicPr>
+          <p:nvPr/>
+        </p:nvPicPr>
+        <p:blipFill>
+          <a:blip r:embed="rId4">
+            <a:extLst>
+              <a:ext uri="{28A0092B-C50C-407E-A947-70E740481C1C}">
+                <a14:useLocalDpi xmlns:a14="http://schemas.microsoft.com/office/drawing/2010/main" val="0"/>
+              </a:ext>
+            </a:extLst>
+          </a:blip>
+          <a:srcRect/>
+          <a:stretch>
+            <a:fillRect/>
+          </a:stretch>
+        </p:blipFill>
+        <p:spPr bwMode="auto">
+          <a:xfrm>
+            <a:off x="2511053" y="1219200"/>
+            <a:ext cx="3661147" cy="2460860"/>
+          </a:xfrm>
+          <a:prstGeom prst="rect">
+            <a:avLst/>
+          </a:prstGeom>
+          <a:noFill/>
+          <a:ln>
+            <a:noFill/>
+          </a:ln>
+          <a:effectLst/>
+          <a:extLst>
+            <a:ext uri="{909E8E84-426E-40DD-AFC4-6F175D3DCCD1}">
+              <a14:hiddenFill xmlns:a14="http://schemas.microsoft.com/office/drawing/2010/main">
+                <a:solidFill>
+                  <a:schemeClr val="accent1"/>
+                </a:solidFill>
+              </a14:hiddenFill>
+            </a:ext>
+            <a:ext uri="{91240B29-F687-4F45-9708-019B960494DF}">
+              <a14:hiddenLine xmlns:a14="http://schemas.microsoft.com/office/drawing/2010/main" w="9525">
+                <a:solidFill>
+                  <a:schemeClr val="tx1"/>
+                </a:solidFill>
+                <a:miter lim="800000"/>
+                <a:headEnd/>
+                <a:tailEnd/>
+              </a14:hiddenLine>
+            </a:ext>
+            <a:ext uri="{AF507438-7753-43E0-B8FC-AC1667EBCBE1}">
+              <a14:hiddenEffects xmlns:a14="http://schemas.microsoft.com/office/drawing/2010/main">
+                <a:effectLst>
+                  <a:outerShdw dist="35921" dir="2700000" algn="ctr" rotWithShape="0">
+                    <a:schemeClr val="bg2"/>
+                  </a:outerShdw>
+                </a:effectLst>
+              </a14:hiddenEffects>
+            </a:ext>
+          </a:extLst>
+        </p:spPr>
+      </p:pic>
+      <p:pic>
+        <p:nvPicPr>
+          <p:cNvPr id="2053" name="Picture 5"/>
+          <p:cNvPicPr>
+            <a:picLocks noChangeAspect="1" noChangeArrowheads="1"/>
+          </p:cNvPicPr>
+          <p:nvPr/>
+        </p:nvPicPr>
+        <p:blipFill>
+          <a:blip r:embed="rId5">
+            <a:extLst>
+              <a:ext uri="{28A0092B-C50C-407E-A947-70E740481C1C}">
+                <a14:useLocalDpi xmlns:a14="http://schemas.microsoft.com/office/drawing/2010/main" val="0"/>
+              </a:ext>
+            </a:extLst>
+          </a:blip>
+          <a:srcRect/>
+          <a:stretch>
+            <a:fillRect/>
+          </a:stretch>
+        </p:blipFill>
+        <p:spPr bwMode="auto">
+          <a:xfrm>
+            <a:off x="5691187" y="3071208"/>
+            <a:ext cx="2995613" cy="3123515"/>
+          </a:xfrm>
+          <a:prstGeom prst="rect">
+            <a:avLst/>
+          </a:prstGeom>
+          <a:noFill/>
+          <a:ln>
+            <a:noFill/>
+          </a:ln>
+          <a:effectLst/>
+          <a:extLst>
+            <a:ext uri="{909E8E84-426E-40DD-AFC4-6F175D3DCCD1}">
+              <a14:hiddenFill xmlns:a14="http://schemas.microsoft.com/office/drawing/2010/main">
+                <a:solidFill>
+                  <a:schemeClr val="accent1"/>
+                </a:solidFill>
+              </a14:hiddenFill>
+            </a:ext>
+            <a:ext uri="{91240B29-F687-4F45-9708-019B960494DF}">
+              <a14:hiddenLine xmlns:a14="http://schemas.microsoft.com/office/drawing/2010/main" w="9525">
+                <a:solidFill>
+                  <a:schemeClr val="tx1"/>
+                </a:solidFill>
+                <a:miter lim="800000"/>
+                <a:headEnd/>
+                <a:tailEnd/>
+              </a14:hiddenLine>
+            </a:ext>
+            <a:ext uri="{AF507438-7753-43E0-B8FC-AC1667EBCBE1}">
+              <a14:hiddenEffects xmlns:a14="http://schemas.microsoft.com/office/drawing/2010/main">
+                <a:effectLst>
+                  <a:outerShdw dist="35921" dir="2700000" algn="ctr" rotWithShape="0">
+                    <a:schemeClr val="bg2"/>
+                  </a:outerShdw>
+                </a:effectLst>
+              </a14:hiddenEffects>
+            </a:ext>
+          </a:extLst>
+        </p:spPr>
+      </p:pic>
     </p:spTree>
   </p:cSld>
   <p:clrMapOvr>
@@ -16553,7 +17291,7 @@
       </p:sp>
       <p:pic>
         <p:nvPicPr>
-          <p:cNvPr id="5" name="Picture 2" descr="C:\Users\lasso\Desktop\DvhOverview.png"/>
+          <p:cNvPr id="3074" name="Picture 2"/>
           <p:cNvPicPr>
             <a:picLocks noChangeAspect="1" noChangeArrowheads="1"/>
           </p:cNvPicPr>
@@ -16574,20 +17312,43 @@
         </p:blipFill>
         <p:spPr bwMode="auto">
           <a:xfrm>
-            <a:off x="192793" y="1143000"/>
-            <a:ext cx="8722607" cy="4724400"/>
+            <a:off x="193088" y="898525"/>
+            <a:ext cx="8763000" cy="4746625"/>
           </a:xfrm>
           <a:prstGeom prst="rect">
             <a:avLst/>
           </a:prstGeom>
           <a:noFill/>
+          <a:ln>
+            <a:noFill/>
+          </a:ln>
+          <a:effectLst/>
           <a:extLst>
             <a:ext uri="{909E8E84-426E-40DD-AFC4-6F175D3DCCD1}">
               <a14:hiddenFill xmlns:a14="http://schemas.microsoft.com/office/drawing/2010/main">
                 <a:solidFill>
-                  <a:srgbClr val="FFFFFF"/>
+                  <a:schemeClr val="accent1"/>
                 </a:solidFill>
               </a14:hiddenFill>
+            </a:ext>
+            <a:ext uri="{91240B29-F687-4F45-9708-019B960494DF}">
+              <a14:hiddenLine xmlns:a14="http://schemas.microsoft.com/office/drawing/2010/main" w="9525">
+                <a:solidFill>
+                  <a:schemeClr val="tx1"/>
+                </a:solidFill>
+                <a:miter lim="800000"/>
+                <a:headEnd/>
+                <a:tailEnd/>
+              </a14:hiddenLine>
+            </a:ext>
+            <a:ext uri="{AF507438-7753-43E0-B8FC-AC1667EBCBE1}">
+              <a14:hiddenEffects xmlns:a14="http://schemas.microsoft.com/office/drawing/2010/main">
+                <a:effectLst>
+                  <a:outerShdw dist="35921" dir="2700000" algn="ctr" rotWithShape="0">
+                    <a:schemeClr val="bg2"/>
+                  </a:outerShdw>
+                </a:effectLst>
+              </a14:hiddenEffects>
             </a:ext>
           </a:extLst>
         </p:spPr>
@@ -16624,6 +17385,70 @@
           <a:chExt cx="0" cy="0"/>
         </a:xfrm>
       </p:grpSpPr>
+      <p:pic>
+        <p:nvPicPr>
+          <p:cNvPr id="4098" name="Picture 2"/>
+          <p:cNvPicPr>
+            <a:picLocks noChangeAspect="1" noChangeArrowheads="1"/>
+          </p:cNvPicPr>
+          <p:nvPr/>
+        </p:nvPicPr>
+        <p:blipFill>
+          <a:blip r:embed="rId3">
+            <a:extLst>
+              <a:ext uri="{28A0092B-C50C-407E-A947-70E740481C1C}">
+                <a14:useLocalDpi xmlns:a14="http://schemas.microsoft.com/office/drawing/2010/main" val="0"/>
+              </a:ext>
+            </a:extLst>
+          </a:blip>
+          <a:srcRect/>
+          <a:stretch>
+            <a:fillRect/>
+          </a:stretch>
+        </p:blipFill>
+        <p:spPr bwMode="auto">
+          <a:xfrm>
+            <a:off x="4488396" y="152400"/>
+            <a:ext cx="4046004" cy="6086475"/>
+          </a:xfrm>
+          <a:prstGeom prst="rect">
+            <a:avLst/>
+          </a:prstGeom>
+          <a:noFill/>
+          <a:ln>
+            <a:noFill/>
+          </a:ln>
+          <a:effectLst/>
+          <a:extLst>
+            <a:ext uri="{909E8E84-426E-40DD-AFC4-6F175D3DCCD1}">
+              <a14:hiddenFill xmlns:a14="http://schemas.microsoft.com/office/drawing/2010/main">
+                <a:solidFill>
+                  <a:schemeClr val="accent1"/>
+                </a:solidFill>
+              </a14:hiddenFill>
+            </a:ext>
+            <a:ext uri="{91240B29-F687-4F45-9708-019B960494DF}">
+              <a14:hiddenLine xmlns:a14="http://schemas.microsoft.com/office/drawing/2010/main" w="9525">
+                <a:solidFill>
+                  <a:schemeClr val="tx1"/>
+                </a:solidFill>
+                <a:miter lim="800000"/>
+                <a:headEnd/>
+                <a:tailEnd/>
+              </a14:hiddenLine>
+            </a:ext>
+            <a:ext uri="{AF507438-7753-43E0-B8FC-AC1667EBCBE1}">
+              <a14:hiddenEffects xmlns:a14="http://schemas.microsoft.com/office/drawing/2010/main">
+                <a:effectLst>
+                  <a:outerShdw dist="35921" dir="2700000" algn="ctr" rotWithShape="0">
+                    <a:schemeClr val="bg2"/>
+                  </a:outerShdw>
+                </a:effectLst>
+              </a14:hiddenEffects>
+            </a:ext>
+          </a:extLst>
+        </p:spPr>
+      </p:pic>
       <p:sp>
         <p:nvSpPr>
           <p:cNvPr id="11" name="Footer Placeholder 10"/>
@@ -16737,47 +17562,6 @@
           </a:p>
         </p:txBody>
       </p:sp>
-      <p:pic>
-        <p:nvPicPr>
-          <p:cNvPr id="1027" name="Picture 3" descr="C:\Users\lasso\Desktop\DoseMetrics.png"/>
-          <p:cNvPicPr>
-            <a:picLocks noChangeAspect="1" noChangeArrowheads="1"/>
-          </p:cNvPicPr>
-          <p:nvPr/>
-        </p:nvPicPr>
-        <p:blipFill>
-          <a:blip r:embed="rId3">
-            <a:extLst>
-              <a:ext uri="{28A0092B-C50C-407E-A947-70E740481C1C}">
-                <a14:useLocalDpi xmlns:a14="http://schemas.microsoft.com/office/drawing/2010/main" val="0"/>
-              </a:ext>
-            </a:extLst>
-          </a:blip>
-          <a:srcRect/>
-          <a:stretch>
-            <a:fillRect/>
-          </a:stretch>
-        </p:blipFill>
-        <p:spPr bwMode="auto">
-          <a:xfrm>
-            <a:off x="4548810" y="228600"/>
-            <a:ext cx="4366590" cy="5870510"/>
-          </a:xfrm>
-          <a:prstGeom prst="rect">
-            <a:avLst/>
-          </a:prstGeom>
-          <a:noFill/>
-          <a:extLst>
-            <a:ext uri="{909E8E84-426E-40DD-AFC4-6F175D3DCCD1}">
-              <a14:hiddenFill xmlns:a14="http://schemas.microsoft.com/office/drawing/2010/main">
-                <a:solidFill>
-                  <a:srgbClr val="FFFFFF"/>
-                </a:solidFill>
-              </a14:hiddenFill>
-            </a:ext>
-          </a:extLst>
-        </p:spPr>
-      </p:pic>
       <p:sp>
         <p:nvSpPr>
           <p:cNvPr id="5" name="Title 1"/>

</xml_diff>